<commit_message>
Updated Capstone PPT with latest changes
</commit_message>
<xml_diff>
--- a/Capstone OnlineBookStore PPT.pptx
+++ b/Capstone OnlineBookStore PPT.pptx
@@ -9135,7 +9135,7 @@
                 </a:solidFill>
                 <a:latin typeface="HK Grotesk"/>
               </a:rPr>
-              <a:t>Database In Azure :</a:t>
+              <a:t> In Azure :</a:t>
             </a:r>
           </a:p>
           <a:p>
@@ -9938,10 +9938,10 @@
       </p:sp>
       <p:pic>
         <p:nvPicPr>
-          <p:cNvPr id="9" name="Picture 8">
-            <a:extLst>
-              <a:ext uri="{FF2B5EF4-FFF2-40B4-BE49-F238E27FC236}">
-                <a16:creationId xmlns:a16="http://schemas.microsoft.com/office/drawing/2014/main" id="{E396AF57-9991-3C9F-D765-5B6CEF5349A2}"/>
+          <p:cNvPr id="7" name="Picture 6">
+            <a:extLst>
+              <a:ext uri="{FF2B5EF4-FFF2-40B4-BE49-F238E27FC236}">
+                <a16:creationId xmlns:a16="http://schemas.microsoft.com/office/drawing/2014/main" id="{3EFC71FA-969F-C2A3-B7C1-C7304329FDE6}"/>
               </a:ext>
             </a:extLst>
           </p:cNvPr>
@@ -9958,8 +9958,8 @@
         </p:blipFill>
         <p:spPr>
           <a:xfrm>
-            <a:off x="570270" y="1494503"/>
-            <a:ext cx="10972801" cy="4667805"/>
+            <a:off x="259441" y="1518209"/>
+            <a:ext cx="11094359" cy="4817444"/>
           </a:xfrm>
           <a:prstGeom prst="rect">
             <a:avLst/>

</xml_diff>